<commit_message>
chore: squash all history into one commit
</commit_message>
<xml_diff>
--- a/apresentação.pptx
+++ b/apresentação.pptx
@@ -3786,6 +3786,42 @@
           </a:p>
         </p:txBody>
       </p:sp>
+      <p:pic>
+        <p:nvPicPr>
+          <p:cNvPr id="3" name="Graphic 2">
+            <a:extLst>
+              <a:ext uri="{FF2B5EF4-FFF2-40B4-BE49-F238E27FC236}">
+                <a16:creationId xmlns:a16="http://schemas.microsoft.com/office/drawing/2014/main" id="{929631CD-8387-42F0-548F-0B07950FBF8C}"/>
+              </a:ext>
+            </a:extLst>
+          </p:cNvPr>
+          <p:cNvPicPr>
+            <a:picLocks noChangeAspect="1"/>
+          </p:cNvPicPr>
+          <p:nvPr/>
+        </p:nvPicPr>
+        <p:blipFill>
+          <a:blip r:embed="rId2">
+            <a:extLst>
+              <a:ext uri="{96DAC541-7B7A-43D3-8B79-37D633B846F1}">
+                <asvg:svgBlip xmlns:asvg="http://schemas.microsoft.com/office/drawing/2016/SVG/main" r:embed="rId3"/>
+              </a:ext>
+            </a:extLst>
+          </a:blip>
+          <a:stretch>
+            <a:fillRect/>
+          </a:stretch>
+        </p:blipFill>
+        <p:spPr>
+          <a:xfrm>
+            <a:off x="5842000" y="809625"/>
+            <a:ext cx="4959351" cy="4959351"/>
+          </a:xfrm>
+          <a:prstGeom prst="rect">
+            <a:avLst/>
+          </a:prstGeom>
+        </p:spPr>
+      </p:pic>
     </p:spTree>
     <p:extLst>
       <p:ext uri="{BB962C8B-B14F-4D97-AF65-F5344CB8AC3E}">
@@ -4324,9 +4360,22 @@
         <p:spPr/>
         <p:txBody>
           <a:bodyPr>
-            <a:normAutofit fontScale="85000" lnSpcReduction="20000"/>
+            <a:normAutofit fontScale="70000" lnSpcReduction="20000"/>
           </a:bodyPr>
           <a:lstStyle/>
+          <a:p>
+            <a:pPr>
+              <a:lnSpc>
+                <a:spcPct val="150000"/>
+              </a:lnSpc>
+            </a:pPr>
+            <a:r>
+              <a:rPr lang="en-US" dirty="0">
+                <a:hlinkClick r:id="rId2"/>
+              </a:rPr>
+              <a:t>Canal D.E.P.L.O.Y</a:t>
+            </a:r>
+          </a:p>
           <a:p>
             <a:pPr>
               <a:lnSpc>

</xml_diff>